<commit_message>
Make the logo bigger.
</commit_message>
<xml_diff>
--- a/docs/MS_Template_Creator_Logo.pptx
+++ b/docs/MS_Template_Creator_Logo.pptx
@@ -7,6 +7,7 @@
   <p:sldIdLst>
     <p:sldId id="257" r:id="rId2"/>
     <p:sldId id="258" r:id="rId3"/>
+    <p:sldId id="259" r:id="rId4"/>
   </p:sldIdLst>
   <p:sldSz cx="12192000" cy="6858000"/>
   <p:notesSz cx="6858000" cy="9144000"/>
@@ -105,6 +106,11 @@
       </a:defRPr>
     </a:lvl9pPr>
   </p:defaultTextStyle>
+  <p:extLst>
+    <p:ext uri="{EFAFB233-063F-42B5-8137-9DF3F51BA10A}">
+      <p15:sldGuideLst xmlns:p15="http://schemas.microsoft.com/office/powerpoint/2012/main"/>
+    </p:ext>
+  </p:extLst>
 </p:presentation>
 </file>
 
@@ -257,7 +263,7 @@
           <a:p>
             <a:fld id="{802D4372-E8C8-49E5-9B62-DC56D8CCE950}" type="datetimeFigureOut">
               <a:rPr lang="en-SG" smtClean="0"/>
-              <a:t>21/8/2021</a:t>
+              <a:t>22/8/2021</a:t>
             </a:fld>
             <a:endParaRPr lang="en-SG"/>
           </a:p>
@@ -457,7 +463,7 @@
           <a:p>
             <a:fld id="{802D4372-E8C8-49E5-9B62-DC56D8CCE950}" type="datetimeFigureOut">
               <a:rPr lang="en-SG" smtClean="0"/>
-              <a:t>21/8/2021</a:t>
+              <a:t>22/8/2021</a:t>
             </a:fld>
             <a:endParaRPr lang="en-SG"/>
           </a:p>
@@ -667,7 +673,7 @@
           <a:p>
             <a:fld id="{802D4372-E8C8-49E5-9B62-DC56D8CCE950}" type="datetimeFigureOut">
               <a:rPr lang="en-SG" smtClean="0"/>
-              <a:t>21/8/2021</a:t>
+              <a:t>22/8/2021</a:t>
             </a:fld>
             <a:endParaRPr lang="en-SG"/>
           </a:p>
@@ -867,7 +873,7 @@
           <a:p>
             <a:fld id="{802D4372-E8C8-49E5-9B62-DC56D8CCE950}" type="datetimeFigureOut">
               <a:rPr lang="en-SG" smtClean="0"/>
-              <a:t>21/8/2021</a:t>
+              <a:t>22/8/2021</a:t>
             </a:fld>
             <a:endParaRPr lang="en-SG"/>
           </a:p>
@@ -1143,7 +1149,7 @@
           <a:p>
             <a:fld id="{802D4372-E8C8-49E5-9B62-DC56D8CCE950}" type="datetimeFigureOut">
               <a:rPr lang="en-SG" smtClean="0"/>
-              <a:t>21/8/2021</a:t>
+              <a:t>22/8/2021</a:t>
             </a:fld>
             <a:endParaRPr lang="en-SG"/>
           </a:p>
@@ -1411,7 +1417,7 @@
           <a:p>
             <a:fld id="{802D4372-E8C8-49E5-9B62-DC56D8CCE950}" type="datetimeFigureOut">
               <a:rPr lang="en-SG" smtClean="0"/>
-              <a:t>21/8/2021</a:t>
+              <a:t>22/8/2021</a:t>
             </a:fld>
             <a:endParaRPr lang="en-SG"/>
           </a:p>
@@ -1826,7 +1832,7 @@
           <a:p>
             <a:fld id="{802D4372-E8C8-49E5-9B62-DC56D8CCE950}" type="datetimeFigureOut">
               <a:rPr lang="en-SG" smtClean="0"/>
-              <a:t>21/8/2021</a:t>
+              <a:t>22/8/2021</a:t>
             </a:fld>
             <a:endParaRPr lang="en-SG"/>
           </a:p>
@@ -1968,7 +1974,7 @@
           <a:p>
             <a:fld id="{802D4372-E8C8-49E5-9B62-DC56D8CCE950}" type="datetimeFigureOut">
               <a:rPr lang="en-SG" smtClean="0"/>
-              <a:t>21/8/2021</a:t>
+              <a:t>22/8/2021</a:t>
             </a:fld>
             <a:endParaRPr lang="en-SG"/>
           </a:p>
@@ -2081,7 +2087,7 @@
           <a:p>
             <a:fld id="{802D4372-E8C8-49E5-9B62-DC56D8CCE950}" type="datetimeFigureOut">
               <a:rPr lang="en-SG" smtClean="0"/>
-              <a:t>21/8/2021</a:t>
+              <a:t>22/8/2021</a:t>
             </a:fld>
             <a:endParaRPr lang="en-SG"/>
           </a:p>
@@ -2394,7 +2400,7 @@
           <a:p>
             <a:fld id="{802D4372-E8C8-49E5-9B62-DC56D8CCE950}" type="datetimeFigureOut">
               <a:rPr lang="en-SG" smtClean="0"/>
-              <a:t>21/8/2021</a:t>
+              <a:t>22/8/2021</a:t>
             </a:fld>
             <a:endParaRPr lang="en-SG"/>
           </a:p>
@@ -2683,7 +2689,7 @@
           <a:p>
             <a:fld id="{802D4372-E8C8-49E5-9B62-DC56D8CCE950}" type="datetimeFigureOut">
               <a:rPr lang="en-SG" smtClean="0"/>
-              <a:t>21/8/2021</a:t>
+              <a:t>22/8/2021</a:t>
             </a:fld>
             <a:endParaRPr lang="en-SG"/>
           </a:p>
@@ -2926,7 +2932,7 @@
           <a:p>
             <a:fld id="{802D4372-E8C8-49E5-9B62-DC56D8CCE950}" type="datetimeFigureOut">
               <a:rPr lang="en-SG" smtClean="0"/>
-              <a:t>21/8/2021</a:t>
+              <a:t>22/8/2021</a:t>
             </a:fld>
             <a:endParaRPr lang="en-SG"/>
           </a:p>
@@ -20491,6 +20497,72 @@
 </p:sld>
 </file>
 
+<file path=ppt/slides/slide3.xml><?xml version="1.0" encoding="utf-8"?>
+<p:sld xmlns:a="http://schemas.openxmlformats.org/drawingml/2006/main" xmlns:r="http://schemas.openxmlformats.org/officeDocument/2006/relationships" xmlns:p="http://schemas.openxmlformats.org/presentationml/2006/main">
+  <p:cSld>
+    <p:spTree>
+      <p:nvGrpSpPr>
+        <p:cNvPr id="1" name=""/>
+        <p:cNvGrpSpPr/>
+        <p:nvPr/>
+      </p:nvGrpSpPr>
+      <p:grpSpPr>
+        <a:xfrm>
+          <a:off x="0" y="0"/>
+          <a:ext cx="0" cy="0"/>
+          <a:chOff x="0" y="0"/>
+          <a:chExt cx="0" cy="0"/>
+        </a:xfrm>
+      </p:grpSpPr>
+      <p:pic>
+        <p:nvPicPr>
+          <p:cNvPr id="3" name="Picture 2">
+            <a:extLst>
+              <a:ext uri="{FF2B5EF4-FFF2-40B4-BE49-F238E27FC236}">
+                <a16:creationId xmlns:a16="http://schemas.microsoft.com/office/drawing/2014/main" id="{EF533E97-B0C8-42AF-9241-41BE12E0E072}"/>
+              </a:ext>
+            </a:extLst>
+          </p:cNvPr>
+          <p:cNvPicPr>
+            <a:picLocks noChangeAspect="1"/>
+          </p:cNvPicPr>
+          <p:nvPr/>
+        </p:nvPicPr>
+        <p:blipFill>
+          <a:blip r:embed="rId2">
+            <a:extLst>
+              <a:ext uri="{28A0092B-C50C-407E-A947-70E740481C1C}">
+                <a14:useLocalDpi xmlns:a14="http://schemas.microsoft.com/office/drawing/2010/main" val="0"/>
+              </a:ext>
+            </a:extLst>
+          </a:blip>
+          <a:stretch>
+            <a:fillRect/>
+          </a:stretch>
+        </p:blipFill>
+        <p:spPr>
+          <a:xfrm>
+            <a:off x="3055997" y="380808"/>
+            <a:ext cx="6504563" cy="6096383"/>
+          </a:xfrm>
+          <a:prstGeom prst="rect">
+            <a:avLst/>
+          </a:prstGeom>
+        </p:spPr>
+      </p:pic>
+    </p:spTree>
+    <p:extLst>
+      <p:ext uri="{BB962C8B-B14F-4D97-AF65-F5344CB8AC3E}">
+        <p14:creationId xmlns:p14="http://schemas.microsoft.com/office/powerpoint/2010/main" val="2924048951"/>
+      </p:ext>
+    </p:extLst>
+  </p:cSld>
+  <p:clrMapOvr>
+    <a:masterClrMapping/>
+  </p:clrMapOvr>
+</p:sld>
+</file>
+
 <file path=ppt/theme/theme1.xml><?xml version="1.0" encoding="utf-8"?>
 <a:theme xmlns:a="http://schemas.openxmlformats.org/drawingml/2006/main" name="Office Theme">
   <a:themeElements>

</xml_diff>